<commit_message>
Se genera versión 2 de los bloques que componen el módulo 1. Se modifican algunas dependencias para el bloque GUI
</commit_message>
<xml_diff>
--- a/Desarrollo/PythonScripts/modules.pptx
+++ b/Desarrollo/PythonScripts/modules.pptx
@@ -104,6 +104,11 @@
       </a:defRPr>
     </a:lvl9pPr>
   </p:defaultTextStyle>
+  <p:extLst>
+    <p:ext uri="{EFAFB233-063F-42B5-8137-9DF3F51BA10A}">
+      <p15:sldGuideLst xmlns:p15="http://schemas.microsoft.com/office/powerpoint/2012/main"/>
+    </p:ext>
+  </p:extLst>
 </p:presentation>
 </file>
 
@@ -256,7 +261,7 @@
           <a:p>
             <a:fld id="{9846D6DE-BF85-4A33-B9EA-55968A0DA751}" type="datetimeFigureOut">
               <a:rPr lang="es-UY" smtClean="0"/>
-              <a:t>17/2/2023</a:t>
+              <a:t>27/2/2023</a:t>
             </a:fld>
             <a:endParaRPr lang="es-UY"/>
           </a:p>
@@ -456,7 +461,7 @@
           <a:p>
             <a:fld id="{9846D6DE-BF85-4A33-B9EA-55968A0DA751}" type="datetimeFigureOut">
               <a:rPr lang="es-UY" smtClean="0"/>
-              <a:t>17/2/2023</a:t>
+              <a:t>27/2/2023</a:t>
             </a:fld>
             <a:endParaRPr lang="es-UY"/>
           </a:p>
@@ -666,7 +671,7 @@
           <a:p>
             <a:fld id="{9846D6DE-BF85-4A33-B9EA-55968A0DA751}" type="datetimeFigureOut">
               <a:rPr lang="es-UY" smtClean="0"/>
-              <a:t>17/2/2023</a:t>
+              <a:t>27/2/2023</a:t>
             </a:fld>
             <a:endParaRPr lang="es-UY"/>
           </a:p>
@@ -866,7 +871,7 @@
           <a:p>
             <a:fld id="{9846D6DE-BF85-4A33-B9EA-55968A0DA751}" type="datetimeFigureOut">
               <a:rPr lang="es-UY" smtClean="0"/>
-              <a:t>17/2/2023</a:t>
+              <a:t>27/2/2023</a:t>
             </a:fld>
             <a:endParaRPr lang="es-UY"/>
           </a:p>
@@ -1142,7 +1147,7 @@
           <a:p>
             <a:fld id="{9846D6DE-BF85-4A33-B9EA-55968A0DA751}" type="datetimeFigureOut">
               <a:rPr lang="es-UY" smtClean="0"/>
-              <a:t>17/2/2023</a:t>
+              <a:t>27/2/2023</a:t>
             </a:fld>
             <a:endParaRPr lang="es-UY"/>
           </a:p>
@@ -1410,7 +1415,7 @@
           <a:p>
             <a:fld id="{9846D6DE-BF85-4A33-B9EA-55968A0DA751}" type="datetimeFigureOut">
               <a:rPr lang="es-UY" smtClean="0"/>
-              <a:t>17/2/2023</a:t>
+              <a:t>27/2/2023</a:t>
             </a:fld>
             <a:endParaRPr lang="es-UY"/>
           </a:p>
@@ -1825,7 +1830,7 @@
           <a:p>
             <a:fld id="{9846D6DE-BF85-4A33-B9EA-55968A0DA751}" type="datetimeFigureOut">
               <a:rPr lang="es-UY" smtClean="0"/>
-              <a:t>17/2/2023</a:t>
+              <a:t>27/2/2023</a:t>
             </a:fld>
             <a:endParaRPr lang="es-UY"/>
           </a:p>
@@ -1967,7 +1972,7 @@
           <a:p>
             <a:fld id="{9846D6DE-BF85-4A33-B9EA-55968A0DA751}" type="datetimeFigureOut">
               <a:rPr lang="es-UY" smtClean="0"/>
-              <a:t>17/2/2023</a:t>
+              <a:t>27/2/2023</a:t>
             </a:fld>
             <a:endParaRPr lang="es-UY"/>
           </a:p>
@@ -2080,7 +2085,7 @@
           <a:p>
             <a:fld id="{9846D6DE-BF85-4A33-B9EA-55968A0DA751}" type="datetimeFigureOut">
               <a:rPr lang="es-UY" smtClean="0"/>
-              <a:t>17/2/2023</a:t>
+              <a:t>27/2/2023</a:t>
             </a:fld>
             <a:endParaRPr lang="es-UY"/>
           </a:p>
@@ -2393,7 +2398,7 @@
           <a:p>
             <a:fld id="{9846D6DE-BF85-4A33-B9EA-55968A0DA751}" type="datetimeFigureOut">
               <a:rPr lang="es-UY" smtClean="0"/>
-              <a:t>17/2/2023</a:t>
+              <a:t>27/2/2023</a:t>
             </a:fld>
             <a:endParaRPr lang="es-UY"/>
           </a:p>
@@ -2682,7 +2687,7 @@
           <a:p>
             <a:fld id="{9846D6DE-BF85-4A33-B9EA-55968A0DA751}" type="datetimeFigureOut">
               <a:rPr lang="es-UY" smtClean="0"/>
-              <a:t>17/2/2023</a:t>
+              <a:t>27/2/2023</a:t>
             </a:fld>
             <a:endParaRPr lang="es-UY"/>
           </a:p>
@@ -2925,7 +2930,7 @@
           <a:p>
             <a:fld id="{9846D6DE-BF85-4A33-B9EA-55968A0DA751}" type="datetimeFigureOut">
               <a:rPr lang="es-UY" smtClean="0"/>
-              <a:t>17/2/2023</a:t>
+              <a:t>27/2/2023</a:t>
             </a:fld>
             <a:endParaRPr lang="es-UY"/>
           </a:p>
@@ -4109,8 +4114,8 @@
           </p:nvSpPr>
           <p:spPr>
             <a:xfrm>
-              <a:off x="3086976" y="2982209"/>
-              <a:ext cx="2629669" cy="369332"/>
+              <a:off x="8999354" y="2525044"/>
+              <a:ext cx="1925995" cy="646331"/>
             </a:xfrm>
             <a:prstGeom prst="rect">
               <a:avLst/>
@@ -4186,7 +4191,7 @@
                     <a:schemeClr val="bg1"/>
                   </a:solidFill>
                 </a:rPr>
-                <a:t>En la primera versión, la configuración del sistema ser hará desde un archivo. Se evaluará generar una GUI posteriormente.</a:t>
+                <a:t>En la primera versión, la configuración del sistema se hará desde un archivo. Se evaluará generar una GUI posteriormente.</a:t>
               </a:r>
               <a:endParaRPr lang="es-UY" sz="1100" dirty="0">
                 <a:solidFill>
@@ -4550,7 +4555,7 @@
         <p:spPr>
           <a:xfrm>
             <a:off x="137989" y="258132"/>
-            <a:ext cx="3807453" cy="369332"/>
+            <a:ext cx="3855543" cy="369332"/>
           </a:xfrm>
           <a:prstGeom prst="rect">
             <a:avLst/>
@@ -4567,7 +4572,7 @@
               <a:rPr lang="es-AR" dirty="0">
                 <a:latin typeface="Berlin Sans FB" panose="020E0602020502020306" pitchFamily="34" charset="0"/>
               </a:rPr>
-              <a:t>Diagrama de bloques para BCI – V1.0</a:t>
+              <a:t>Diagrama de bloques para BCI – V2.0</a:t>
             </a:r>
             <a:endParaRPr lang="es-UY" dirty="0">
               <a:latin typeface="Berlin Sans FB" panose="020E0602020502020306" pitchFamily="34" charset="0"/>
@@ -4825,7 +4830,7 @@
         </p:nvSpPr>
         <p:spPr>
           <a:xfrm>
-            <a:off x="5904334" y="3055258"/>
+            <a:off x="5852572" y="3020629"/>
             <a:ext cx="2629669" cy="369332"/>
           </a:xfrm>
           <a:prstGeom prst="rect">
@@ -4850,9 +4855,91 @@
             <a:pPr algn="ctr"/>
             <a:r>
               <a:rPr lang="es-AR" dirty="0"/>
+              <a:t>Gestiona tiempos</a:t>
+            </a:r>
+            <a:endParaRPr lang="es-UY" dirty="0"/>
+          </a:p>
+        </p:txBody>
+      </p:sp>
+      <p:sp>
+        <p:nvSpPr>
+          <p:cNvPr id="35" name="TextBox 34">
+            <a:extLst>
+              <a:ext uri="{FF2B5EF4-FFF2-40B4-BE49-F238E27FC236}">
+                <a16:creationId xmlns:a16="http://schemas.microsoft.com/office/drawing/2014/main" id="{9B0BD3CB-A1E6-4DC8-B272-FF1519794856}"/>
+              </a:ext>
+            </a:extLst>
+          </p:cNvPr>
+          <p:cNvSpPr txBox="1"/>
+          <p:nvPr/>
+        </p:nvSpPr>
+        <p:spPr>
+          <a:xfrm>
+            <a:off x="2956646" y="3014869"/>
+            <a:ext cx="2629669" cy="369332"/>
+          </a:xfrm>
+          <a:prstGeom prst="rect">
+            <a:avLst/>
+          </a:prstGeom>
+          <a:solidFill>
+            <a:schemeClr val="bg1"/>
+          </a:solidFill>
+          <a:ln>
+            <a:solidFill>
+              <a:srgbClr val="002060"/>
+            </a:solidFill>
+            <a:prstDash val="dash"/>
+          </a:ln>
+        </p:spPr>
+        <p:txBody>
+          <a:bodyPr wrap="square" rtlCol="0">
+            <a:spAutoFit/>
+          </a:bodyPr>
+          <a:lstStyle/>
+          <a:p>
+            <a:pPr algn="ctr"/>
+            <a:r>
+              <a:rPr lang="es-AR" dirty="0"/>
               <a:t>Genera y Registra eventos</a:t>
             </a:r>
             <a:endParaRPr lang="es-UY" dirty="0"/>
+          </a:p>
+        </p:txBody>
+      </p:sp>
+      <p:sp>
+        <p:nvSpPr>
+          <p:cNvPr id="36" name="TextBox 35">
+            <a:extLst>
+              <a:ext uri="{FF2B5EF4-FFF2-40B4-BE49-F238E27FC236}">
+                <a16:creationId xmlns:a16="http://schemas.microsoft.com/office/drawing/2014/main" id="{CDA3189F-6290-498E-B1C3-A00778530965}"/>
+              </a:ext>
+            </a:extLst>
+          </p:cNvPr>
+          <p:cNvSpPr txBox="1"/>
+          <p:nvPr/>
+        </p:nvSpPr>
+        <p:spPr>
+          <a:xfrm>
+            <a:off x="10016047" y="2046525"/>
+            <a:ext cx="954173" cy="276999"/>
+          </a:xfrm>
+          <a:prstGeom prst="rect">
+            <a:avLst/>
+          </a:prstGeom>
+          <a:noFill/>
+        </p:spPr>
+        <p:txBody>
+          <a:bodyPr wrap="square" rtlCol="0">
+            <a:spAutoFit/>
+          </a:bodyPr>
+          <a:lstStyle/>
+          <a:p>
+            <a:pPr algn="ctr"/>
+            <a:r>
+              <a:rPr lang="es-AR" sz="1200" dirty="0"/>
+              <a:t>Eventos</a:t>
+            </a:r>
+            <a:endParaRPr lang="es-UY" sz="1200" dirty="0"/>
           </a:p>
         </p:txBody>
       </p:sp>

</xml_diff>